<commit_message>
take snapshot images for our projects 3
</commit_message>
<xml_diff>
--- a/실무테스트_TaxiGuider_카카오택시따라잡기.pptx
+++ b/실무테스트_TaxiGuider_카카오택시따라잡기.pptx
@@ -272,7 +272,7 @@
           <a:p>
             <a:fld id="{654931E1-3547-5F4D-A496-A8982F82D872}" type="datetimeFigureOut">
               <a:rPr kumimoji="1" lang="ko-KR" altLang="en-US" smtClean="0"/>
-              <a:t>2021-02-28</a:t>
+              <a:t>2021-03-03</a:t>
             </a:fld>
             <a:endParaRPr kumimoji="1" lang="ko-KR" altLang="en-US"/>
           </a:p>
@@ -440,7 +440,7 @@
           <a:p>
             <a:fld id="{654931E1-3547-5F4D-A496-A8982F82D872}" type="datetimeFigureOut">
               <a:rPr kumimoji="1" lang="ko-KR" altLang="en-US" smtClean="0"/>
-              <a:t>2021-02-28</a:t>
+              <a:t>2021-03-03</a:t>
             </a:fld>
             <a:endParaRPr kumimoji="1" lang="ko-KR" altLang="en-US"/>
           </a:p>
@@ -618,7 +618,7 @@
           <a:p>
             <a:fld id="{654931E1-3547-5F4D-A496-A8982F82D872}" type="datetimeFigureOut">
               <a:rPr kumimoji="1" lang="ko-KR" altLang="en-US" smtClean="0"/>
-              <a:t>2021-02-28</a:t>
+              <a:t>2021-03-03</a:t>
             </a:fld>
             <a:endParaRPr kumimoji="1" lang="ko-KR" altLang="en-US"/>
           </a:p>
@@ -786,7 +786,7 @@
           <a:p>
             <a:fld id="{654931E1-3547-5F4D-A496-A8982F82D872}" type="datetimeFigureOut">
               <a:rPr kumimoji="1" lang="ko-KR" altLang="en-US" smtClean="0"/>
-              <a:t>2021-02-28</a:t>
+              <a:t>2021-03-03</a:t>
             </a:fld>
             <a:endParaRPr kumimoji="1" lang="ko-KR" altLang="en-US"/>
           </a:p>
@@ -1031,7 +1031,7 @@
           <a:p>
             <a:fld id="{654931E1-3547-5F4D-A496-A8982F82D872}" type="datetimeFigureOut">
               <a:rPr kumimoji="1" lang="ko-KR" altLang="en-US" smtClean="0"/>
-              <a:t>2021-02-28</a:t>
+              <a:t>2021-03-03</a:t>
             </a:fld>
             <a:endParaRPr kumimoji="1" lang="ko-KR" altLang="en-US"/>
           </a:p>
@@ -1260,7 +1260,7 @@
           <a:p>
             <a:fld id="{654931E1-3547-5F4D-A496-A8982F82D872}" type="datetimeFigureOut">
               <a:rPr kumimoji="1" lang="ko-KR" altLang="en-US" smtClean="0"/>
-              <a:t>2021-02-28</a:t>
+              <a:t>2021-03-03</a:t>
             </a:fld>
             <a:endParaRPr kumimoji="1" lang="ko-KR" altLang="en-US"/>
           </a:p>
@@ -1624,7 +1624,7 @@
           <a:p>
             <a:fld id="{654931E1-3547-5F4D-A496-A8982F82D872}" type="datetimeFigureOut">
               <a:rPr kumimoji="1" lang="ko-KR" altLang="en-US" smtClean="0"/>
-              <a:t>2021-02-28</a:t>
+              <a:t>2021-03-03</a:t>
             </a:fld>
             <a:endParaRPr kumimoji="1" lang="ko-KR" altLang="en-US"/>
           </a:p>
@@ -1741,7 +1741,7 @@
           <a:p>
             <a:fld id="{654931E1-3547-5F4D-A496-A8982F82D872}" type="datetimeFigureOut">
               <a:rPr kumimoji="1" lang="ko-KR" altLang="en-US" smtClean="0"/>
-              <a:t>2021-02-28</a:t>
+              <a:t>2021-03-03</a:t>
             </a:fld>
             <a:endParaRPr kumimoji="1" lang="ko-KR" altLang="en-US"/>
           </a:p>
@@ -1836,7 +1836,7 @@
           <a:p>
             <a:fld id="{654931E1-3547-5F4D-A496-A8982F82D872}" type="datetimeFigureOut">
               <a:rPr kumimoji="1" lang="ko-KR" altLang="en-US" smtClean="0"/>
-              <a:t>2021-02-28</a:t>
+              <a:t>2021-03-03</a:t>
             </a:fld>
             <a:endParaRPr kumimoji="1" lang="ko-KR" altLang="en-US"/>
           </a:p>
@@ -2111,7 +2111,7 @@
           <a:p>
             <a:fld id="{654931E1-3547-5F4D-A496-A8982F82D872}" type="datetimeFigureOut">
               <a:rPr kumimoji="1" lang="ko-KR" altLang="en-US" smtClean="0"/>
-              <a:t>2021-02-28</a:t>
+              <a:t>2021-03-03</a:t>
             </a:fld>
             <a:endParaRPr kumimoji="1" lang="ko-KR" altLang="en-US"/>
           </a:p>
@@ -2363,7 +2363,7 @@
           <a:p>
             <a:fld id="{654931E1-3547-5F4D-A496-A8982F82D872}" type="datetimeFigureOut">
               <a:rPr kumimoji="1" lang="ko-KR" altLang="en-US" smtClean="0"/>
-              <a:t>2021-02-28</a:t>
+              <a:t>2021-03-03</a:t>
             </a:fld>
             <a:endParaRPr kumimoji="1" lang="ko-KR" altLang="en-US"/>
           </a:p>
@@ -2574,7 +2574,7 @@
           <a:p>
             <a:fld id="{654931E1-3547-5F4D-A496-A8982F82D872}" type="datetimeFigureOut">
               <a:rPr kumimoji="1" lang="ko-KR" altLang="en-US" smtClean="0"/>
-              <a:t>2021-02-28</a:t>
+              <a:t>2021-03-03</a:t>
             </a:fld>
             <a:endParaRPr kumimoji="1" lang="ko-KR" altLang="en-US"/>
           </a:p>
@@ -20756,14 +20756,6 @@
             <a:lstStyle/>
             <a:p>
               <a:pPr algn="ctr"/>
-              <a:r>
-                <a:rPr kumimoji="1" lang="en-US" altLang="ko-KR" sz="1200" b="1" dirty="0" err="1">
-                  <a:solidFill>
-                    <a:schemeClr val="tx1"/>
-                  </a:solidFill>
-                </a:rPr>
-                <a:t>taximanage</a:t>
-              </a:r>
               <a:endParaRPr kumimoji="1" lang="ko-KR" altLang="en-US" sz="1200" b="1" dirty="0">
                 <a:solidFill>
                   <a:schemeClr val="tx1"/>
@@ -21506,14 +21498,6 @@
             <a:lstStyle/>
             <a:p>
               <a:pPr algn="ctr"/>
-              <a:r>
-                <a:rPr kumimoji="1" lang="en-US" altLang="ko-KR" sz="1200" b="1" dirty="0" err="1">
-                  <a:solidFill>
-                    <a:schemeClr val="tx1"/>
-                  </a:solidFill>
-                </a:rPr>
-                <a:t>taxiassgin</a:t>
-              </a:r>
               <a:endParaRPr kumimoji="1" lang="ko-KR" altLang="en-US" sz="1200" b="1" dirty="0">
                 <a:solidFill>
                   <a:schemeClr val="tx1"/>
@@ -22265,6 +22249,91 @@
           </a:fontRef>
         </p:style>
       </p:cxnSp>
+      <p:sp>
+        <p:nvSpPr>
+          <p:cNvPr id="42" name="TextBox 41">
+            <a:extLst>
+              <a:ext uri="{FF2B5EF4-FFF2-40B4-BE49-F238E27FC236}">
+                <a16:creationId xmlns:a16="http://schemas.microsoft.com/office/drawing/2014/main" id="{64FE1C7F-B557-4743-B4A1-3C2B86BA84C5}"/>
+              </a:ext>
+            </a:extLst>
+          </p:cNvPr>
+          <p:cNvSpPr txBox="1"/>
+          <p:nvPr/>
+        </p:nvSpPr>
+        <p:spPr>
+          <a:xfrm>
+            <a:off x="4187278" y="3209027"/>
+            <a:ext cx="1329454" cy="276999"/>
+          </a:xfrm>
+          <a:prstGeom prst="rect">
+            <a:avLst/>
+          </a:prstGeom>
+          <a:noFill/>
+        </p:spPr>
+        <p:txBody>
+          <a:bodyPr wrap="square">
+            <a:spAutoFit/>
+          </a:bodyPr>
+          <a:lstStyle/>
+          <a:p>
+            <a:pPr algn="ctr"/>
+            <a:r>
+              <a:rPr kumimoji="1" lang="en-US" altLang="ko-KR" sz="1200" b="1" dirty="0" err="1">
+                <a:solidFill>
+                  <a:schemeClr val="tx1"/>
+                </a:solidFill>
+              </a:rPr>
+              <a:t>taximanage</a:t>
+            </a:r>
+            <a:endParaRPr kumimoji="1" lang="ko-KR" altLang="en-US" sz="1200" b="1" dirty="0">
+              <a:solidFill>
+                <a:schemeClr val="tx1"/>
+              </a:solidFill>
+            </a:endParaRPr>
+          </a:p>
+        </p:txBody>
+      </p:sp>
+      <p:sp>
+        <p:nvSpPr>
+          <p:cNvPr id="46" name="TextBox 45">
+            <a:extLst>
+              <a:ext uri="{FF2B5EF4-FFF2-40B4-BE49-F238E27FC236}">
+                <a16:creationId xmlns:a16="http://schemas.microsoft.com/office/drawing/2014/main" id="{8F0EE6EB-4066-44DF-BFC1-2DE115E6BACC}"/>
+              </a:ext>
+            </a:extLst>
+          </p:cNvPr>
+          <p:cNvSpPr txBox="1"/>
+          <p:nvPr/>
+        </p:nvSpPr>
+        <p:spPr>
+          <a:xfrm>
+            <a:off x="7505199" y="3248096"/>
+            <a:ext cx="963967" cy="276999"/>
+          </a:xfrm>
+          <a:prstGeom prst="rect">
+            <a:avLst/>
+          </a:prstGeom>
+          <a:noFill/>
+        </p:spPr>
+        <p:txBody>
+          <a:bodyPr wrap="square">
+            <a:spAutoFit/>
+          </a:bodyPr>
+          <a:lstStyle/>
+          <a:p>
+            <a:r>
+              <a:rPr kumimoji="1" lang="en-US" altLang="ko-KR" sz="1200" b="1" dirty="0" err="1">
+                <a:solidFill>
+                  <a:schemeClr val="tx1"/>
+                </a:solidFill>
+              </a:rPr>
+              <a:t>taxiassgin</a:t>
+            </a:r>
+            <a:endParaRPr lang="ko-KR" altLang="en-US" sz="1200" dirty="0"/>
+          </a:p>
+        </p:txBody>
+      </p:sp>
     </p:spTree>
     <p:extLst>
       <p:ext uri="{BB962C8B-B14F-4D97-AF65-F5344CB8AC3E}">

</xml_diff>